<commit_message>
modify ddl of ch2 & ch3
</commit_message>
<xml_diff>
--- a/labs requirements.pptx
+++ b/labs requirements.pptx
@@ -265,7 +265,7 @@
           <a:p>
             <a:fld id="{FCD1B0E7-7A14-43A7-8971-2F83AC4B4961}" type="datetimeFigureOut">
               <a:rPr lang="zh-CN" altLang="en-US" smtClean="0"/>
-              <a:t>2021/9/28</a:t>
+              <a:t>2021/9/30</a:t>
             </a:fld>
             <a:endParaRPr lang="zh-CN" altLang="en-US"/>
           </a:p>
@@ -463,7 +463,7 @@
           <a:p>
             <a:fld id="{FCD1B0E7-7A14-43A7-8971-2F83AC4B4961}" type="datetimeFigureOut">
               <a:rPr lang="zh-CN" altLang="en-US" smtClean="0"/>
-              <a:t>2021/9/28</a:t>
+              <a:t>2021/9/30</a:t>
             </a:fld>
             <a:endParaRPr lang="zh-CN" altLang="en-US"/>
           </a:p>
@@ -671,7 +671,7 @@
           <a:p>
             <a:fld id="{FCD1B0E7-7A14-43A7-8971-2F83AC4B4961}" type="datetimeFigureOut">
               <a:rPr lang="zh-CN" altLang="en-US" smtClean="0"/>
-              <a:t>2021/9/28</a:t>
+              <a:t>2021/9/30</a:t>
             </a:fld>
             <a:endParaRPr lang="zh-CN" altLang="en-US"/>
           </a:p>
@@ -869,7 +869,7 @@
           <a:p>
             <a:fld id="{FCD1B0E7-7A14-43A7-8971-2F83AC4B4961}" type="datetimeFigureOut">
               <a:rPr lang="zh-CN" altLang="en-US" smtClean="0"/>
-              <a:t>2021/9/28</a:t>
+              <a:t>2021/9/30</a:t>
             </a:fld>
             <a:endParaRPr lang="zh-CN" altLang="en-US"/>
           </a:p>
@@ -1144,7 +1144,7 @@
           <a:p>
             <a:fld id="{FCD1B0E7-7A14-43A7-8971-2F83AC4B4961}" type="datetimeFigureOut">
               <a:rPr lang="zh-CN" altLang="en-US" smtClean="0"/>
-              <a:t>2021/9/28</a:t>
+              <a:t>2021/9/30</a:t>
             </a:fld>
             <a:endParaRPr lang="zh-CN" altLang="en-US"/>
           </a:p>
@@ -1409,7 +1409,7 @@
           <a:p>
             <a:fld id="{FCD1B0E7-7A14-43A7-8971-2F83AC4B4961}" type="datetimeFigureOut">
               <a:rPr lang="zh-CN" altLang="en-US" smtClean="0"/>
-              <a:t>2021/9/28</a:t>
+              <a:t>2021/9/30</a:t>
             </a:fld>
             <a:endParaRPr lang="zh-CN" altLang="en-US"/>
           </a:p>
@@ -1821,7 +1821,7 @@
           <a:p>
             <a:fld id="{FCD1B0E7-7A14-43A7-8971-2F83AC4B4961}" type="datetimeFigureOut">
               <a:rPr lang="zh-CN" altLang="en-US" smtClean="0"/>
-              <a:t>2021/9/28</a:t>
+              <a:t>2021/9/30</a:t>
             </a:fld>
             <a:endParaRPr lang="zh-CN" altLang="en-US"/>
           </a:p>
@@ -1962,7 +1962,7 @@
           <a:p>
             <a:fld id="{FCD1B0E7-7A14-43A7-8971-2F83AC4B4961}" type="datetimeFigureOut">
               <a:rPr lang="zh-CN" altLang="en-US" smtClean="0"/>
-              <a:t>2021/9/28</a:t>
+              <a:t>2021/9/30</a:t>
             </a:fld>
             <a:endParaRPr lang="zh-CN" altLang="en-US"/>
           </a:p>
@@ -2075,7 +2075,7 @@
           <a:p>
             <a:fld id="{FCD1B0E7-7A14-43A7-8971-2F83AC4B4961}" type="datetimeFigureOut">
               <a:rPr lang="zh-CN" altLang="en-US" smtClean="0"/>
-              <a:t>2021/9/28</a:t>
+              <a:t>2021/9/30</a:t>
             </a:fld>
             <a:endParaRPr lang="zh-CN" altLang="en-US"/>
           </a:p>
@@ -2386,7 +2386,7 @@
           <a:p>
             <a:fld id="{FCD1B0E7-7A14-43A7-8971-2F83AC4B4961}" type="datetimeFigureOut">
               <a:rPr lang="zh-CN" altLang="en-US" smtClean="0"/>
-              <a:t>2021/9/28</a:t>
+              <a:t>2021/9/30</a:t>
             </a:fld>
             <a:endParaRPr lang="zh-CN" altLang="en-US"/>
           </a:p>
@@ -2674,7 +2674,7 @@
           <a:p>
             <a:fld id="{FCD1B0E7-7A14-43A7-8971-2F83AC4B4961}" type="datetimeFigureOut">
               <a:rPr lang="zh-CN" altLang="en-US" smtClean="0"/>
-              <a:t>2021/9/28</a:t>
+              <a:t>2021/9/30</a:t>
             </a:fld>
             <a:endParaRPr lang="zh-CN" altLang="en-US"/>
           </a:p>
@@ -2915,7 +2915,7 @@
           <a:p>
             <a:fld id="{FCD1B0E7-7A14-43A7-8971-2F83AC4B4961}" type="datetimeFigureOut">
               <a:rPr lang="zh-CN" altLang="en-US" smtClean="0"/>
-              <a:t>2021/9/28</a:t>
+              <a:t>2021/9/30</a:t>
             </a:fld>
             <a:endParaRPr lang="zh-CN" altLang="en-US"/>
           </a:p>
@@ -6168,8 +6168,8 @@
         </p:nvSpPr>
         <p:spPr>
           <a:xfrm>
-            <a:off x="8573610" y="5869904"/>
-            <a:ext cx="3376964" cy="369332"/>
+            <a:off x="8238478" y="5869904"/>
+            <a:ext cx="3712096" cy="369332"/>
           </a:xfrm>
           <a:prstGeom prst="rect">
             <a:avLst/>
@@ -6221,7 +6221,7 @@
                 </a:solidFill>
                 <a:latin typeface="微软雅黑" panose="020B0503020204020204" pitchFamily="34" charset="-122"/>
               </a:rPr>
-              <a:t>3</a:t>
+              <a:t>10</a:t>
             </a:r>
             <a:r>
               <a:rPr lang="zh-CN" altLang="en-US" b="1" dirty="0">
@@ -7554,7 +7554,7 @@
                 </a:solidFill>
                 <a:latin typeface="微软雅黑" panose="020B0503020204020204" pitchFamily="34" charset="-122"/>
               </a:rPr>
-              <a:t>10</a:t>
+              <a:t>30</a:t>
             </a:r>
             <a:r>
               <a:rPr lang="zh-CN" altLang="en-US" b="1" dirty="0">

</xml_diff>